<commit_message>
DOC fix a bug in `local.png`
	modified:   figure_source.pptx
	modified:   local.png
</commit_message>
<xml_diff>
--- a/figure_source.pptx
+++ b/figure_source.pptx
@@ -111,6 +111,11 @@
       </a:defRPr>
     </a:lvl9pPr>
   </p:defaultTextStyle>
+  <p:extLst>
+    <p:ext uri="{EFAFB233-063F-42B5-8137-9DF3F51BA10A}">
+      <p15:sldGuideLst xmlns:p15="http://schemas.microsoft.com/office/powerpoint/2012/main"/>
+    </p:ext>
+  </p:extLst>
 </p:presentation>
 </file>
 
@@ -18593,7 +18598,7 @@
         <p:spPr>
           <a:xfrm>
             <a:off x="5053693" y="3084504"/>
-            <a:ext cx="4175814" cy="954107"/>
+            <a:ext cx="5184321" cy="954107"/>
           </a:xfrm>
           <a:prstGeom prst="rect">
             <a:avLst/>
@@ -18617,6 +18622,30 @@
               <a:t>{your new branch for PR}</a:t>
             </a:r>
             <a:r>
+              <a:rPr lang="en-US" altLang="zh-CN" sz="1400" b="1" dirty="0">
+                <a:solidFill>
+                  <a:srgbClr val="FF0000"/>
+                </a:solidFill>
+              </a:rPr>
+              <a:t>/</a:t>
+            </a:r>
+            <a:r>
+              <a:rPr lang="en-US" altLang="zh-CN" sz="1400" b="1" dirty="0" err="1" smtClean="0">
+                <a:solidFill>
+                  <a:srgbClr val="FF0000"/>
+                </a:solidFill>
+              </a:rPr>
+              <a:t>github</a:t>
+            </a:r>
+            <a:r>
+              <a:rPr lang="en-US" altLang="zh-CN" sz="1400" b="1" dirty="0" smtClean="0">
+                <a:solidFill>
+                  <a:srgbClr val="FF0000"/>
+                </a:solidFill>
+              </a:rPr>
+              <a:t>-collaboration</a:t>
+            </a:r>
+            <a:r>
               <a:rPr lang="en-US" altLang="zh-CN" sz="1400" b="1" dirty="0" smtClean="0">
                 <a:solidFill>
                   <a:srgbClr val="FF0000"/>
@@ -18632,7 +18661,15 @@
                   <a:srgbClr val="FF0000"/>
                 </a:solidFill>
               </a:rPr>
-              <a:t>Then send PR on the web</a:t>
+              <a:t>Then </a:t>
+            </a:r>
+            <a:r>
+              <a:rPr lang="en-US" altLang="zh-CN" sz="1400" b="1" dirty="0" smtClean="0">
+                <a:solidFill>
+                  <a:srgbClr val="FF0000"/>
+                </a:solidFill>
+              </a:rPr>
+              <a:t>send PR on the web</a:t>
             </a:r>
             <a:endParaRPr lang="zh-CN" altLang="en-US" sz="1400" b="1" dirty="0" smtClean="0">
               <a:solidFill>

</xml_diff>